<commit_message>
Creating scenese for the basic field
</commit_message>
<xml_diff>
--- a/Pics/Bemutato.pptx
+++ b/Pics/Bemutato.pptx
@@ -6,7 +6,9 @@
   </p:sldMasterIdLst>
   <p:sldIdLst>
     <p:sldId id="256" r:id="rId2"/>
-    <p:sldId id="257" r:id="rId3"/>
+    <p:sldId id="258" r:id="rId3"/>
+    <p:sldId id="259" r:id="rId4"/>
+    <p:sldId id="260" r:id="rId5"/>
   </p:sldIdLst>
   <p:sldSz cx="12192000" cy="6858000"/>
   <p:notesSz cx="6858000" cy="9144000"/>
@@ -105,6 +107,11 @@
       </a:defRPr>
     </a:lvl9pPr>
   </p:defaultTextStyle>
+  <p:extLst>
+    <p:ext uri="{EFAFB233-063F-42B5-8137-9DF3F51BA10A}">
+      <p15:sldGuideLst xmlns:p15="http://schemas.microsoft.com/office/powerpoint/2012/main"/>
+    </p:ext>
+  </p:extLst>
 </p:presentation>
 </file>
 
@@ -255,7 +262,7 @@
           <a:p>
             <a:fld id="{AE162AEE-D172-46F7-AEF3-5CC18ED7D2F0}" type="datetimeFigureOut">
               <a:rPr lang="hu-HU" smtClean="0"/>
-              <a:t>2022. 05. 03.</a:t>
+              <a:t>2022. 05. 15.</a:t>
             </a:fld>
             <a:endParaRPr lang="hu-HU"/>
           </a:p>
@@ -453,7 +460,7 @@
           <a:p>
             <a:fld id="{AE162AEE-D172-46F7-AEF3-5CC18ED7D2F0}" type="datetimeFigureOut">
               <a:rPr lang="hu-HU" smtClean="0"/>
-              <a:t>2022. 05. 03.</a:t>
+              <a:t>2022. 05. 15.</a:t>
             </a:fld>
             <a:endParaRPr lang="hu-HU"/>
           </a:p>
@@ -661,7 +668,7 @@
           <a:p>
             <a:fld id="{AE162AEE-D172-46F7-AEF3-5CC18ED7D2F0}" type="datetimeFigureOut">
               <a:rPr lang="hu-HU" smtClean="0"/>
-              <a:t>2022. 05. 03.</a:t>
+              <a:t>2022. 05. 15.</a:t>
             </a:fld>
             <a:endParaRPr lang="hu-HU"/>
           </a:p>
@@ -859,7 +866,7 @@
           <a:p>
             <a:fld id="{AE162AEE-D172-46F7-AEF3-5CC18ED7D2F0}" type="datetimeFigureOut">
               <a:rPr lang="hu-HU" smtClean="0"/>
-              <a:t>2022. 05. 03.</a:t>
+              <a:t>2022. 05. 15.</a:t>
             </a:fld>
             <a:endParaRPr lang="hu-HU"/>
           </a:p>
@@ -1134,7 +1141,7 @@
           <a:p>
             <a:fld id="{AE162AEE-D172-46F7-AEF3-5CC18ED7D2F0}" type="datetimeFigureOut">
               <a:rPr lang="hu-HU" smtClean="0"/>
-              <a:t>2022. 05. 03.</a:t>
+              <a:t>2022. 05. 15.</a:t>
             </a:fld>
             <a:endParaRPr lang="hu-HU"/>
           </a:p>
@@ -1399,7 +1406,7 @@
           <a:p>
             <a:fld id="{AE162AEE-D172-46F7-AEF3-5CC18ED7D2F0}" type="datetimeFigureOut">
               <a:rPr lang="hu-HU" smtClean="0"/>
-              <a:t>2022. 05. 03.</a:t>
+              <a:t>2022. 05. 15.</a:t>
             </a:fld>
             <a:endParaRPr lang="hu-HU"/>
           </a:p>
@@ -1811,7 +1818,7 @@
           <a:p>
             <a:fld id="{AE162AEE-D172-46F7-AEF3-5CC18ED7D2F0}" type="datetimeFigureOut">
               <a:rPr lang="hu-HU" smtClean="0"/>
-              <a:t>2022. 05. 03.</a:t>
+              <a:t>2022. 05. 15.</a:t>
             </a:fld>
             <a:endParaRPr lang="hu-HU"/>
           </a:p>
@@ -1952,7 +1959,7 @@
           <a:p>
             <a:fld id="{AE162AEE-D172-46F7-AEF3-5CC18ED7D2F0}" type="datetimeFigureOut">
               <a:rPr lang="hu-HU" smtClean="0"/>
-              <a:t>2022. 05. 03.</a:t>
+              <a:t>2022. 05. 15.</a:t>
             </a:fld>
             <a:endParaRPr lang="hu-HU"/>
           </a:p>
@@ -2065,7 +2072,7 @@
           <a:p>
             <a:fld id="{AE162AEE-D172-46F7-AEF3-5CC18ED7D2F0}" type="datetimeFigureOut">
               <a:rPr lang="hu-HU" smtClean="0"/>
-              <a:t>2022. 05. 03.</a:t>
+              <a:t>2022. 05. 15.</a:t>
             </a:fld>
             <a:endParaRPr lang="hu-HU"/>
           </a:p>
@@ -2376,7 +2383,7 @@
           <a:p>
             <a:fld id="{AE162AEE-D172-46F7-AEF3-5CC18ED7D2F0}" type="datetimeFigureOut">
               <a:rPr lang="hu-HU" smtClean="0"/>
-              <a:t>2022. 05. 03.</a:t>
+              <a:t>2022. 05. 15.</a:t>
             </a:fld>
             <a:endParaRPr lang="hu-HU"/>
           </a:p>
@@ -2664,7 +2671,7 @@
           <a:p>
             <a:fld id="{AE162AEE-D172-46F7-AEF3-5CC18ED7D2F0}" type="datetimeFigureOut">
               <a:rPr lang="hu-HU" smtClean="0"/>
-              <a:t>2022. 05. 03.</a:t>
+              <a:t>2022. 05. 15.</a:t>
             </a:fld>
             <a:endParaRPr lang="hu-HU"/>
           </a:p>
@@ -2905,7 +2912,7 @@
           <a:p>
             <a:fld id="{AE162AEE-D172-46F7-AEF3-5CC18ED7D2F0}" type="datetimeFigureOut">
               <a:rPr lang="hu-HU" smtClean="0"/>
-              <a:t>2022. 05. 03.</a:t>
+              <a:t>2022. 05. 15.</a:t>
             </a:fld>
             <a:endParaRPr lang="hu-HU"/>
           </a:p>
@@ -3811,10 +3818,10 @@
       </p:grpSpPr>
       <p:pic>
         <p:nvPicPr>
-          <p:cNvPr id="5" name="Kép 4">
-            <a:extLst>
-              <a:ext uri="{FF2B5EF4-FFF2-40B4-BE49-F238E27FC236}">
-                <a16:creationId xmlns:a16="http://schemas.microsoft.com/office/drawing/2014/main" id="{D5D21786-9F99-30E6-7C3C-7BA21E01DDDB}"/>
+          <p:cNvPr id="21" name="Kép 20">
+            <a:extLst>
+              <a:ext uri="{FF2B5EF4-FFF2-40B4-BE49-F238E27FC236}">
+                <a16:creationId xmlns:a16="http://schemas.microsoft.com/office/drawing/2014/main" id="{35182C24-A003-A11B-3B49-9A12B6A104E7}"/>
               </a:ext>
             </a:extLst>
           </p:cNvPr>
@@ -3824,21 +3831,15 @@
           <p:nvPr/>
         </p:nvPicPr>
         <p:blipFill>
-          <a:blip r:embed="rId2">
-            <a:extLst>
-              <a:ext uri="{28A0092B-C50C-407E-A947-70E740481C1C}">
-                <a14:useLocalDpi xmlns:a14="http://schemas.microsoft.com/office/drawing/2010/main" val="0"/>
-              </a:ext>
-            </a:extLst>
-          </a:blip>
+          <a:blip r:embed="rId2"/>
           <a:stretch>
             <a:fillRect/>
           </a:stretch>
         </p:blipFill>
         <p:spPr>
           <a:xfrm>
-            <a:off x="0" y="238968"/>
-            <a:ext cx="12192000" cy="5809090"/>
+            <a:off x="0" y="0"/>
+            <a:ext cx="12192000" cy="6858000"/>
           </a:xfrm>
           <a:prstGeom prst="rect">
             <a:avLst/>
@@ -3847,10 +3848,10 @@
       </p:pic>
       <p:pic>
         <p:nvPicPr>
-          <p:cNvPr id="9" name="Kép 8" descr="A képen szöveg, játék, clipart, vektorgrafika látható&#10;&#10;Automatikusan generált leírás">
-            <a:extLst>
-              <a:ext uri="{FF2B5EF4-FFF2-40B4-BE49-F238E27FC236}">
-                <a16:creationId xmlns:a16="http://schemas.microsoft.com/office/drawing/2014/main" id="{5B7E6698-A3A0-CDE8-1883-D8DAD0AE4398}"/>
+          <p:cNvPr id="20" name="Kép 19">
+            <a:extLst>
+              <a:ext uri="{FF2B5EF4-FFF2-40B4-BE49-F238E27FC236}">
+                <a16:creationId xmlns:a16="http://schemas.microsoft.com/office/drawing/2014/main" id="{328F442B-77FB-6EF6-560A-48F61E833533}"/>
               </a:ext>
             </a:extLst>
           </p:cNvPr>
@@ -3859,7 +3860,7 @@
           </p:cNvPicPr>
           <p:nvPr/>
         </p:nvPicPr>
-        <p:blipFill>
+        <p:blipFill rotWithShape="1">
           <a:blip r:embed="rId3">
             <a:extLst>
               <a:ext uri="{28A0092B-C50C-407E-A947-70E740481C1C}">
@@ -3867,14 +3868,13 @@
               </a:ext>
             </a:extLst>
           </a:blip>
-          <a:stretch>
-            <a:fillRect/>
-          </a:stretch>
+          <a:srcRect l="5000" t="2336" r="4861" b="10499"/>
+          <a:stretch/>
         </p:blipFill>
         <p:spPr>
           <a:xfrm>
-            <a:off x="2066925" y="3248297"/>
-            <a:ext cx="918689" cy="1543042"/>
+            <a:off x="309710" y="531564"/>
+            <a:ext cx="11640312" cy="5362795"/>
           </a:xfrm>
           <a:prstGeom prst="rect">
             <a:avLst/>
@@ -3883,121 +3883,30 @@
       </p:pic>
       <p:sp>
         <p:nvSpPr>
-          <p:cNvPr id="13" name="Szövegdoboz 12">
-            <a:extLst>
-              <a:ext uri="{FF2B5EF4-FFF2-40B4-BE49-F238E27FC236}">
-                <a16:creationId xmlns:a16="http://schemas.microsoft.com/office/drawing/2014/main" id="{96121766-5FF9-3797-8783-DC0517C0F200}"/>
-              </a:ext>
-            </a:extLst>
-          </p:cNvPr>
-          <p:cNvSpPr txBox="1"/>
+          <p:cNvPr id="8" name="Téglalap 7">
+            <a:extLst>
+              <a:ext uri="{FF2B5EF4-FFF2-40B4-BE49-F238E27FC236}">
+                <a16:creationId xmlns:a16="http://schemas.microsoft.com/office/drawing/2014/main" id="{B50761D4-9B34-5B00-D130-69971024FFA3}"/>
+              </a:ext>
+            </a:extLst>
+          </p:cNvPr>
+          <p:cNvSpPr/>
           <p:nvPr/>
         </p:nvSpPr>
         <p:spPr>
           <a:xfrm>
-            <a:off x="1029707" y="5930529"/>
-            <a:ext cx="1774845" cy="430887"/>
+            <a:off x="1198645" y="5531562"/>
+            <a:ext cx="900059" cy="379730"/>
           </a:xfrm>
           <a:prstGeom prst="rect">
             <a:avLst/>
           </a:prstGeom>
-          <a:noFill/>
-        </p:spPr>
-        <p:txBody>
-          <a:bodyPr wrap="none" rtlCol="0">
-            <a:spAutoFit/>
-          </a:bodyPr>
-          <a:lstStyle/>
-          <a:p>
-            <a:r>
-              <a:rPr lang="en-US" sz="2200" dirty="0">
-                <a:solidFill>
-                  <a:schemeClr val="bg1"/>
-                </a:solidFill>
-                <a:latin typeface="Agency FB" panose="020B0503020202020204" pitchFamily="34" charset="0"/>
-              </a:rPr>
-              <a:t>V2, it is your turn.</a:t>
-            </a:r>
-            <a:endParaRPr lang="hu-HU" sz="2200" dirty="0">
-              <a:solidFill>
-                <a:schemeClr val="bg1"/>
-              </a:solidFill>
-              <a:latin typeface="Agency FB" panose="020B0503020202020204" pitchFamily="34" charset="0"/>
-            </a:endParaRPr>
-          </a:p>
-        </p:txBody>
-      </p:sp>
-      <p:pic>
-        <p:nvPicPr>
-          <p:cNvPr id="15" name="Ábra 14" descr="Közepes hangerő körvonalas">
-            <a:extLst>
-              <a:ext uri="{FF2B5EF4-FFF2-40B4-BE49-F238E27FC236}">
-                <a16:creationId xmlns:a16="http://schemas.microsoft.com/office/drawing/2014/main" id="{963D3B8F-4CF6-83C4-D666-08828654D5CE}"/>
-              </a:ext>
-            </a:extLst>
-          </p:cNvPr>
-          <p:cNvPicPr>
-            <a:picLocks noChangeAspect="1"/>
-          </p:cNvPicPr>
-          <p:nvPr/>
-        </p:nvPicPr>
-        <p:blipFill>
-          <a:blip r:embed="rId4">
-            <a:extLst>
-              <a:ext uri="{28A0092B-C50C-407E-A947-70E740481C1C}">
-                <a14:useLocalDpi xmlns:a14="http://schemas.microsoft.com/office/drawing/2010/main" val="0"/>
-              </a:ext>
-              <a:ext uri="{96DAC541-7B7A-43D3-8B79-37D633B846F1}">
-                <asvg:svgBlip xmlns:asvg="http://schemas.microsoft.com/office/drawing/2016/SVG/main" r:embed="rId5"/>
-              </a:ext>
-            </a:extLst>
-          </a:blip>
-          <a:stretch>
-            <a:fillRect/>
-          </a:stretch>
-        </p:blipFill>
-        <p:spPr>
-          <a:xfrm>
-            <a:off x="11294030" y="56088"/>
-            <a:ext cx="314496" cy="314496"/>
-          </a:xfrm>
-          <a:prstGeom prst="rect">
-            <a:avLst/>
-          </a:prstGeom>
-        </p:spPr>
-      </p:pic>
-      <p:sp>
-        <p:nvSpPr>
-          <p:cNvPr id="16" name="Szorzás jele 15">
-            <a:extLst>
-              <a:ext uri="{FF2B5EF4-FFF2-40B4-BE49-F238E27FC236}">
-                <a16:creationId xmlns:a16="http://schemas.microsoft.com/office/drawing/2014/main" id="{42DB7F59-DFFB-C294-D88A-77A75404C507}"/>
-              </a:ext>
-            </a:extLst>
-          </p:cNvPr>
-          <p:cNvSpPr/>
-          <p:nvPr/>
-        </p:nvSpPr>
-        <p:spPr>
-          <a:xfrm>
-            <a:off x="11703331" y="56088"/>
-            <a:ext cx="358028" cy="314496"/>
-          </a:xfrm>
-          <a:prstGeom prst="mathMultiply">
-            <a:avLst>
-              <a:gd name="adj1" fmla="val 2352"/>
-            </a:avLst>
-          </a:prstGeom>
           <a:solidFill>
-            <a:schemeClr val="bg1">
-              <a:lumMod val="85000"/>
-            </a:schemeClr>
+            <a:srgbClr val="202020"/>
           </a:solidFill>
-          <a:ln>
+          <a:ln w="19050">
             <a:solidFill>
-              <a:schemeClr val="bg1">
-                <a:lumMod val="75000"/>
-              </a:schemeClr>
+              <a:srgbClr val="6D6B5B"/>
             </a:solidFill>
           </a:ln>
         </p:spPr>
@@ -4022,16 +3931,306 @@
           <a:lstStyle/>
           <a:p>
             <a:pPr algn="ctr"/>
-            <a:endParaRPr lang="hu-HU"/>
-          </a:p>
-        </p:txBody>
-      </p:sp>
+            <a:endParaRPr lang="hu-HU" sz="2000" dirty="0">
+              <a:solidFill>
+                <a:schemeClr val="bg1">
+                  <a:lumMod val="95000"/>
+                </a:schemeClr>
+              </a:solidFill>
+              <a:latin typeface="Agency FB" panose="020B0503020202020204" pitchFamily="34" charset="0"/>
+            </a:endParaRPr>
+          </a:p>
+        </p:txBody>
+      </p:sp>
+      <p:pic>
+        <p:nvPicPr>
+          <p:cNvPr id="12" name="Kép 11">
+            <a:extLst>
+              <a:ext uri="{FF2B5EF4-FFF2-40B4-BE49-F238E27FC236}">
+                <a16:creationId xmlns:a16="http://schemas.microsoft.com/office/drawing/2014/main" id="{D62F8703-DE4E-BFF3-800A-6C0FE7EC562D}"/>
+              </a:ext>
+            </a:extLst>
+          </p:cNvPr>
+          <p:cNvPicPr>
+            <a:picLocks noChangeAspect="1"/>
+          </p:cNvPicPr>
+          <p:nvPr/>
+        </p:nvPicPr>
+        <p:blipFill>
+          <a:blip r:embed="rId4">
+            <a:extLst>
+              <a:ext uri="{28A0092B-C50C-407E-A947-70E740481C1C}">
+                <a14:useLocalDpi xmlns:a14="http://schemas.microsoft.com/office/drawing/2010/main" val="0"/>
+              </a:ext>
+            </a:extLst>
+          </a:blip>
+          <a:stretch>
+            <a:fillRect/>
+          </a:stretch>
+        </p:blipFill>
+        <p:spPr>
+          <a:xfrm>
+            <a:off x="3231711" y="3505201"/>
+            <a:ext cx="743363" cy="1752600"/>
+          </a:xfrm>
+          <a:prstGeom prst="rect">
+            <a:avLst/>
+          </a:prstGeom>
+        </p:spPr>
+      </p:pic>
+      <p:pic>
+        <p:nvPicPr>
+          <p:cNvPr id="14" name="Kép 13">
+            <a:extLst>
+              <a:ext uri="{FF2B5EF4-FFF2-40B4-BE49-F238E27FC236}">
+                <a16:creationId xmlns:a16="http://schemas.microsoft.com/office/drawing/2014/main" id="{A95D59B8-16A6-CB8F-1468-6680002C148D}"/>
+              </a:ext>
+            </a:extLst>
+          </p:cNvPr>
+          <p:cNvPicPr>
+            <a:picLocks noChangeAspect="1"/>
+          </p:cNvPicPr>
+          <p:nvPr/>
+        </p:nvPicPr>
+        <p:blipFill>
+          <a:blip r:embed="rId5">
+            <a:extLst>
+              <a:ext uri="{28A0092B-C50C-407E-A947-70E740481C1C}">
+                <a14:useLocalDpi xmlns:a14="http://schemas.microsoft.com/office/drawing/2010/main" val="0"/>
+              </a:ext>
+            </a:extLst>
+          </a:blip>
+          <a:stretch>
+            <a:fillRect/>
+          </a:stretch>
+        </p:blipFill>
+        <p:spPr>
+          <a:xfrm>
+            <a:off x="13327256" y="533936"/>
+            <a:ext cx="744655" cy="1755648"/>
+          </a:xfrm>
+          <a:prstGeom prst="rect">
+            <a:avLst/>
+          </a:prstGeom>
+        </p:spPr>
+      </p:pic>
+      <p:pic>
+        <p:nvPicPr>
+          <p:cNvPr id="16" name="Kép 15" descr="A képen szöveg, clipart, vektorgrafika látható&#10;&#10;Automatikusan generált leírás">
+            <a:extLst>
+              <a:ext uri="{FF2B5EF4-FFF2-40B4-BE49-F238E27FC236}">
+                <a16:creationId xmlns:a16="http://schemas.microsoft.com/office/drawing/2014/main" id="{4A3EF4D2-1502-ECE5-CDBD-339E8A956204}"/>
+              </a:ext>
+            </a:extLst>
+          </p:cNvPr>
+          <p:cNvPicPr>
+            <a:picLocks noChangeAspect="1"/>
+          </p:cNvPicPr>
+          <p:nvPr/>
+        </p:nvPicPr>
+        <p:blipFill>
+          <a:blip r:embed="rId6">
+            <a:extLst>
+              <a:ext uri="{28A0092B-C50C-407E-A947-70E740481C1C}">
+                <a14:useLocalDpi xmlns:a14="http://schemas.microsoft.com/office/drawing/2010/main" val="0"/>
+              </a:ext>
+            </a:extLst>
+          </a:blip>
+          <a:stretch>
+            <a:fillRect/>
+          </a:stretch>
+        </p:blipFill>
+        <p:spPr>
+          <a:xfrm flipH="1">
+            <a:off x="15434818" y="2335137"/>
+            <a:ext cx="744655" cy="1755648"/>
+          </a:xfrm>
+          <a:prstGeom prst="rect">
+            <a:avLst/>
+          </a:prstGeom>
+        </p:spPr>
+      </p:pic>
+      <p:pic>
+        <p:nvPicPr>
+          <p:cNvPr id="18" name="Kép 17">
+            <a:extLst>
+              <a:ext uri="{FF2B5EF4-FFF2-40B4-BE49-F238E27FC236}">
+                <a16:creationId xmlns:a16="http://schemas.microsoft.com/office/drawing/2014/main" id="{B6BB7779-FBDB-D4E0-D1A7-6E7576966D02}"/>
+              </a:ext>
+            </a:extLst>
+          </p:cNvPr>
+          <p:cNvPicPr>
+            <a:picLocks noChangeAspect="1"/>
+          </p:cNvPicPr>
+          <p:nvPr/>
+        </p:nvPicPr>
+        <p:blipFill>
+          <a:blip r:embed="rId7">
+            <a:extLst>
+              <a:ext uri="{28A0092B-C50C-407E-A947-70E740481C1C}">
+                <a14:useLocalDpi xmlns:a14="http://schemas.microsoft.com/office/drawing/2010/main" val="0"/>
+              </a:ext>
+            </a:extLst>
+          </a:blip>
+          <a:stretch>
+            <a:fillRect/>
+          </a:stretch>
+        </p:blipFill>
+        <p:spPr>
+          <a:xfrm>
+            <a:off x="-1631916" y="2551176"/>
+            <a:ext cx="1141745" cy="1755648"/>
+          </a:xfrm>
+          <a:prstGeom prst="rect">
+            <a:avLst/>
+          </a:prstGeom>
+        </p:spPr>
+      </p:pic>
+      <p:pic>
+        <p:nvPicPr>
+          <p:cNvPr id="22" name="Kép 21">
+            <a:extLst>
+              <a:ext uri="{FF2B5EF4-FFF2-40B4-BE49-F238E27FC236}">
+                <a16:creationId xmlns:a16="http://schemas.microsoft.com/office/drawing/2014/main" id="{E4F92A3E-3951-6616-04EF-61E65664139A}"/>
+              </a:ext>
+            </a:extLst>
+          </p:cNvPr>
+          <p:cNvPicPr>
+            <a:picLocks noChangeAspect="1"/>
+          </p:cNvPicPr>
+          <p:nvPr/>
+        </p:nvPicPr>
+        <p:blipFill>
+          <a:blip r:embed="rId7">
+            <a:extLst>
+              <a:ext uri="{28A0092B-C50C-407E-A947-70E740481C1C}">
+                <a14:useLocalDpi xmlns:a14="http://schemas.microsoft.com/office/drawing/2010/main" val="0"/>
+              </a:ext>
+            </a:extLst>
+          </a:blip>
+          <a:stretch>
+            <a:fillRect/>
+          </a:stretch>
+        </p:blipFill>
+        <p:spPr>
+          <a:xfrm flipH="1">
+            <a:off x="7053472" y="3513668"/>
+            <a:ext cx="1141745" cy="1755648"/>
+          </a:xfrm>
+          <a:prstGeom prst="rect">
+            <a:avLst/>
+          </a:prstGeom>
+        </p:spPr>
+      </p:pic>
+    </p:spTree>
+    <p:extLst>
+      <p:ext uri="{BB962C8B-B14F-4D97-AF65-F5344CB8AC3E}">
+        <p14:creationId xmlns:p14="http://schemas.microsoft.com/office/powerpoint/2010/main" val="1078019550"/>
+      </p:ext>
+    </p:extLst>
+  </p:cSld>
+  <p:clrMapOvr>
+    <a:masterClrMapping/>
+  </p:clrMapOvr>
+</p:sld>
+</file>
+
+<file path=ppt/slides/slide3.xml><?xml version="1.0" encoding="utf-8"?>
+<p:sld xmlns:a="http://schemas.openxmlformats.org/drawingml/2006/main" xmlns:r="http://schemas.openxmlformats.org/officeDocument/2006/relationships" xmlns:p="http://schemas.openxmlformats.org/presentationml/2006/main">
+  <p:cSld>
+    <p:bg>
+      <p:bgPr>
+        <a:solidFill>
+          <a:srgbClr val="000000"/>
+        </a:solidFill>
+        <a:effectLst/>
+      </p:bgPr>
+    </p:bg>
+    <p:spTree>
+      <p:nvGrpSpPr>
+        <p:cNvPr id="1" name=""/>
+        <p:cNvGrpSpPr/>
+        <p:nvPr/>
+      </p:nvGrpSpPr>
+      <p:grpSpPr>
+        <a:xfrm>
+          <a:off x="0" y="0"/>
+          <a:ext cx="0" cy="0"/>
+          <a:chOff x="0" y="0"/>
+          <a:chExt cx="0" cy="0"/>
+        </a:xfrm>
+      </p:grpSpPr>
+      <p:pic>
+        <p:nvPicPr>
+          <p:cNvPr id="13" name="Kép 12">
+            <a:extLst>
+              <a:ext uri="{FF2B5EF4-FFF2-40B4-BE49-F238E27FC236}">
+                <a16:creationId xmlns:a16="http://schemas.microsoft.com/office/drawing/2014/main" id="{409B8F5C-E785-9FD2-8E3E-C516C81D505B}"/>
+              </a:ext>
+            </a:extLst>
+          </p:cNvPr>
+          <p:cNvPicPr>
+            <a:picLocks noChangeAspect="1"/>
+          </p:cNvPicPr>
+          <p:nvPr/>
+        </p:nvPicPr>
+        <p:blipFill>
+          <a:blip r:embed="rId2"/>
+          <a:stretch>
+            <a:fillRect/>
+          </a:stretch>
+        </p:blipFill>
+        <p:spPr>
+          <a:xfrm>
+            <a:off x="0" y="0"/>
+            <a:ext cx="12192000" cy="6858000"/>
+          </a:xfrm>
+          <a:prstGeom prst="rect">
+            <a:avLst/>
+          </a:prstGeom>
+        </p:spPr>
+      </p:pic>
+      <p:pic>
+        <p:nvPicPr>
+          <p:cNvPr id="9" name="Kép 8">
+            <a:extLst>
+              <a:ext uri="{FF2B5EF4-FFF2-40B4-BE49-F238E27FC236}">
+                <a16:creationId xmlns:a16="http://schemas.microsoft.com/office/drawing/2014/main" id="{8EE36B59-9AF8-B5B8-4800-6C542DF3170C}"/>
+              </a:ext>
+            </a:extLst>
+          </p:cNvPr>
+          <p:cNvPicPr>
+            <a:picLocks noChangeAspect="1"/>
+          </p:cNvPicPr>
+          <p:nvPr/>
+        </p:nvPicPr>
+        <p:blipFill rotWithShape="1">
+          <a:blip r:embed="rId3">
+            <a:extLst>
+              <a:ext uri="{28A0092B-C50C-407E-A947-70E740481C1C}">
+                <a14:useLocalDpi xmlns:a14="http://schemas.microsoft.com/office/drawing/2010/main" val="0"/>
+              </a:ext>
+            </a:extLst>
+          </a:blip>
+          <a:srcRect l="5077" t="2834" r="4693" b="10705"/>
+          <a:stretch/>
+        </p:blipFill>
+        <p:spPr>
+          <a:xfrm>
+            <a:off x="315119" y="557713"/>
+            <a:ext cx="11663360" cy="5324578"/>
+          </a:xfrm>
+          <a:prstGeom prst="rect">
+            <a:avLst/>
+          </a:prstGeom>
+        </p:spPr>
+      </p:pic>
       <p:sp>
         <p:nvSpPr>
           <p:cNvPr id="17" name="Téglalap 16">
             <a:extLst>
               <a:ext uri="{FF2B5EF4-FFF2-40B4-BE49-F238E27FC236}">
-                <a16:creationId xmlns:a16="http://schemas.microsoft.com/office/drawing/2014/main" id="{A191EA00-8132-250B-5E78-0535DC01AF71}"/>
+                <a16:creationId xmlns:a16="http://schemas.microsoft.com/office/drawing/2014/main" id="{F4B995A4-7A41-33F9-8339-4DEA391F7C4D}"/>
               </a:ext>
             </a:extLst>
           </p:cNvPr>
@@ -4040,7 +4239,7 @@
         </p:nvSpPr>
         <p:spPr>
           <a:xfrm>
-            <a:off x="1166865" y="5171069"/>
+            <a:off x="1198645" y="5531562"/>
             <a:ext cx="900059" cy="379730"/>
           </a:xfrm>
           <a:prstGeom prst="rect">
@@ -4076,17 +4275,6 @@
           <a:lstStyle/>
           <a:p>
             <a:pPr algn="ctr"/>
-            <a:r>
-              <a:rPr lang="en-US" sz="2000" dirty="0">
-                <a:solidFill>
-                  <a:schemeClr val="bg1">
-                    <a:lumMod val="95000"/>
-                  </a:schemeClr>
-                </a:solidFill>
-                <a:latin typeface="Agency FB" panose="020B0503020202020204" pitchFamily="34" charset="0"/>
-              </a:rPr>
-              <a:t>Next</a:t>
-            </a:r>
             <a:endParaRPr lang="hu-HU" sz="2000" dirty="0">
               <a:solidFill>
                 <a:schemeClr val="bg1">
@@ -4100,10 +4288,10 @@
       </p:sp>
       <p:pic>
         <p:nvPicPr>
-          <p:cNvPr id="3" name="Kép 2" descr="A képen szöveg látható&#10;&#10;Automatikusan generált leírás">
-            <a:extLst>
-              <a:ext uri="{FF2B5EF4-FFF2-40B4-BE49-F238E27FC236}">
-                <a16:creationId xmlns:a16="http://schemas.microsoft.com/office/drawing/2014/main" id="{7C6D53F1-A00E-3D4E-EE70-F8F0EC68BCD7}"/>
+          <p:cNvPr id="19" name="Kép 18" descr="A képen szöveg, clipart, vektorgrafika látható&#10;&#10;Automatikusan generált leírás">
+            <a:extLst>
+              <a:ext uri="{FF2B5EF4-FFF2-40B4-BE49-F238E27FC236}">
+                <a16:creationId xmlns:a16="http://schemas.microsoft.com/office/drawing/2014/main" id="{0E10E0F2-8A19-0173-758A-95F994E2CA07}"/>
               </a:ext>
             </a:extLst>
           </p:cNvPr>
@@ -4112,21 +4300,22 @@
           </p:cNvPicPr>
           <p:nvPr/>
         </p:nvPicPr>
-        <p:blipFill rotWithShape="1">
-          <a:blip r:embed="rId6">
+        <p:blipFill>
+          <a:blip r:embed="rId4">
             <a:extLst>
               <a:ext uri="{28A0092B-C50C-407E-A947-70E740481C1C}">
                 <a14:useLocalDpi xmlns:a14="http://schemas.microsoft.com/office/drawing/2010/main" val="0"/>
               </a:ext>
             </a:extLst>
           </a:blip>
-          <a:srcRect t="48872"/>
-          <a:stretch/>
+          <a:stretch>
+            <a:fillRect/>
+          </a:stretch>
         </p:blipFill>
         <p:spPr>
-          <a:xfrm>
-            <a:off x="7001779" y="4802769"/>
-            <a:ext cx="4023357" cy="748030"/>
+          <a:xfrm flipH="1">
+            <a:off x="13260633" y="4306824"/>
+            <a:ext cx="744655" cy="1755648"/>
           </a:xfrm>
           <a:prstGeom prst="rect">
             <a:avLst/>
@@ -4135,10 +4324,82 @@
       </p:pic>
       <p:pic>
         <p:nvPicPr>
-          <p:cNvPr id="6" name="Kép 5">
-            <a:extLst>
-              <a:ext uri="{FF2B5EF4-FFF2-40B4-BE49-F238E27FC236}">
-                <a16:creationId xmlns:a16="http://schemas.microsoft.com/office/drawing/2014/main" id="{09836533-9F49-3C96-541B-A4F00CA796EF}"/>
+          <p:cNvPr id="20" name="Kép 19">
+            <a:extLst>
+              <a:ext uri="{FF2B5EF4-FFF2-40B4-BE49-F238E27FC236}">
+                <a16:creationId xmlns:a16="http://schemas.microsoft.com/office/drawing/2014/main" id="{48A9BD39-1D9A-E8EE-BF6E-909103B54915}"/>
+              </a:ext>
+            </a:extLst>
+          </p:cNvPr>
+          <p:cNvPicPr>
+            <a:picLocks noChangeAspect="1"/>
+          </p:cNvPicPr>
+          <p:nvPr/>
+        </p:nvPicPr>
+        <p:blipFill>
+          <a:blip r:embed="rId5">
+            <a:extLst>
+              <a:ext uri="{28A0092B-C50C-407E-A947-70E740481C1C}">
+                <a14:useLocalDpi xmlns:a14="http://schemas.microsoft.com/office/drawing/2010/main" val="0"/>
+              </a:ext>
+            </a:extLst>
+          </a:blip>
+          <a:stretch>
+            <a:fillRect/>
+          </a:stretch>
+        </p:blipFill>
+        <p:spPr>
+          <a:xfrm>
+            <a:off x="3231711" y="3505201"/>
+            <a:ext cx="743363" cy="1752600"/>
+          </a:xfrm>
+          <a:prstGeom prst="rect">
+            <a:avLst/>
+          </a:prstGeom>
+        </p:spPr>
+      </p:pic>
+      <p:pic>
+        <p:nvPicPr>
+          <p:cNvPr id="21" name="Kép 20">
+            <a:extLst>
+              <a:ext uri="{FF2B5EF4-FFF2-40B4-BE49-F238E27FC236}">
+                <a16:creationId xmlns:a16="http://schemas.microsoft.com/office/drawing/2014/main" id="{0FABC869-D1D7-E012-64FA-FC7F21849ED3}"/>
+              </a:ext>
+            </a:extLst>
+          </p:cNvPr>
+          <p:cNvPicPr>
+            <a:picLocks noChangeAspect="1"/>
+          </p:cNvPicPr>
+          <p:nvPr/>
+        </p:nvPicPr>
+        <p:blipFill>
+          <a:blip r:embed="rId6">
+            <a:extLst>
+              <a:ext uri="{28A0092B-C50C-407E-A947-70E740481C1C}">
+                <a14:useLocalDpi xmlns:a14="http://schemas.microsoft.com/office/drawing/2010/main" val="0"/>
+              </a:ext>
+            </a:extLst>
+          </a:blip>
+          <a:stretch>
+            <a:fillRect/>
+          </a:stretch>
+        </p:blipFill>
+        <p:spPr>
+          <a:xfrm>
+            <a:off x="13429955" y="658297"/>
+            <a:ext cx="744655" cy="1755648"/>
+          </a:xfrm>
+          <a:prstGeom prst="rect">
+            <a:avLst/>
+          </a:prstGeom>
+        </p:spPr>
+      </p:pic>
+      <p:pic>
+        <p:nvPicPr>
+          <p:cNvPr id="22" name="Kép 21" descr="A képen szöveg, clipart, vektorgrafika látható&#10;&#10;Automatikusan generált leírás">
+            <a:extLst>
+              <a:ext uri="{FF2B5EF4-FFF2-40B4-BE49-F238E27FC236}">
+                <a16:creationId xmlns:a16="http://schemas.microsoft.com/office/drawing/2014/main" id="{456918ED-E89A-6D8B-E0DA-4780DD865078}"/>
               </a:ext>
             </a:extLst>
           </p:cNvPr>
@@ -4160,9 +4421,9 @@
           </a:stretch>
         </p:blipFill>
         <p:spPr>
-          <a:xfrm>
-            <a:off x="3837077" y="1680106"/>
-            <a:ext cx="2093459" cy="3136382"/>
+          <a:xfrm flipH="1">
+            <a:off x="14522743" y="2551176"/>
+            <a:ext cx="744655" cy="1755648"/>
           </a:xfrm>
           <a:prstGeom prst="rect">
             <a:avLst/>
@@ -4171,10 +4432,10 @@
       </p:pic>
       <p:pic>
         <p:nvPicPr>
-          <p:cNvPr id="18" name="Ábra 17" descr="Férfi orvos körvonalas">
-            <a:extLst>
-              <a:ext uri="{FF2B5EF4-FFF2-40B4-BE49-F238E27FC236}">
-                <a16:creationId xmlns:a16="http://schemas.microsoft.com/office/drawing/2014/main" id="{263A0353-7561-DCED-1938-D8EA6E13F15A}"/>
+          <p:cNvPr id="23" name="Kép 22">
+            <a:extLst>
+              <a:ext uri="{FF2B5EF4-FFF2-40B4-BE49-F238E27FC236}">
+                <a16:creationId xmlns:a16="http://schemas.microsoft.com/office/drawing/2014/main" id="{8D62D831-7FE7-E878-358A-3EA67CFFE851}"/>
               </a:ext>
             </a:extLst>
           </p:cNvPr>
@@ -4189,9 +4450,6 @@
               <a:ext uri="{28A0092B-C50C-407E-A947-70E740481C1C}">
                 <a14:useLocalDpi xmlns:a14="http://schemas.microsoft.com/office/drawing/2010/main" val="0"/>
               </a:ext>
-              <a:ext uri="{96DAC541-7B7A-43D3-8B79-37D633B846F1}">
-                <asvg:svgBlip xmlns:asvg="http://schemas.microsoft.com/office/drawing/2016/SVG/main" r:embed="rId9"/>
-              </a:ext>
             </a:extLst>
           </a:blip>
           <a:stretch>
@@ -4200,8 +4458,8 @@
         </p:blipFill>
         <p:spPr>
           <a:xfrm>
-            <a:off x="10827809" y="56088"/>
-            <a:ext cx="314496" cy="314496"/>
+            <a:off x="-2752028" y="1818780"/>
+            <a:ext cx="1141745" cy="1755648"/>
           </a:xfrm>
           <a:prstGeom prst="rect">
             <a:avLst/>
@@ -4211,7 +4469,351 @@
     </p:spTree>
     <p:extLst>
       <p:ext uri="{BB962C8B-B14F-4D97-AF65-F5344CB8AC3E}">
-        <p14:creationId xmlns:p14="http://schemas.microsoft.com/office/powerpoint/2010/main" val="1679238896"/>
+        <p14:creationId xmlns:p14="http://schemas.microsoft.com/office/powerpoint/2010/main" val="2793842135"/>
+      </p:ext>
+    </p:extLst>
+  </p:cSld>
+  <p:clrMapOvr>
+    <a:masterClrMapping/>
+  </p:clrMapOvr>
+</p:sld>
+</file>
+
+<file path=ppt/slides/slide4.xml><?xml version="1.0" encoding="utf-8"?>
+<p:sld xmlns:a="http://schemas.openxmlformats.org/drawingml/2006/main" xmlns:r="http://schemas.openxmlformats.org/officeDocument/2006/relationships" xmlns:p="http://schemas.openxmlformats.org/presentationml/2006/main">
+  <p:cSld>
+    <p:bg>
+      <p:bgPr>
+        <a:solidFill>
+          <a:srgbClr val="000000"/>
+        </a:solidFill>
+        <a:effectLst/>
+      </p:bgPr>
+    </p:bg>
+    <p:spTree>
+      <p:nvGrpSpPr>
+        <p:cNvPr id="1" name=""/>
+        <p:cNvGrpSpPr/>
+        <p:nvPr/>
+      </p:nvGrpSpPr>
+      <p:grpSpPr>
+        <a:xfrm>
+          <a:off x="0" y="0"/>
+          <a:ext cx="0" cy="0"/>
+          <a:chOff x="0" y="0"/>
+          <a:chExt cx="0" cy="0"/>
+        </a:xfrm>
+      </p:grpSpPr>
+      <p:pic>
+        <p:nvPicPr>
+          <p:cNvPr id="13" name="Kép 12">
+            <a:extLst>
+              <a:ext uri="{FF2B5EF4-FFF2-40B4-BE49-F238E27FC236}">
+                <a16:creationId xmlns:a16="http://schemas.microsoft.com/office/drawing/2014/main" id="{2618A7BA-1E1B-3096-76C7-1085AABCA930}"/>
+              </a:ext>
+            </a:extLst>
+          </p:cNvPr>
+          <p:cNvPicPr>
+            <a:picLocks noChangeAspect="1"/>
+          </p:cNvPicPr>
+          <p:nvPr/>
+        </p:nvPicPr>
+        <p:blipFill>
+          <a:blip r:embed="rId2"/>
+          <a:stretch>
+            <a:fillRect/>
+          </a:stretch>
+        </p:blipFill>
+        <p:spPr>
+          <a:xfrm>
+            <a:off x="0" y="0"/>
+            <a:ext cx="12192000" cy="6858000"/>
+          </a:xfrm>
+          <a:prstGeom prst="rect">
+            <a:avLst/>
+          </a:prstGeom>
+        </p:spPr>
+      </p:pic>
+      <p:pic>
+        <p:nvPicPr>
+          <p:cNvPr id="11" name="Kép 10">
+            <a:extLst>
+              <a:ext uri="{FF2B5EF4-FFF2-40B4-BE49-F238E27FC236}">
+                <a16:creationId xmlns:a16="http://schemas.microsoft.com/office/drawing/2014/main" id="{CB5680F6-2FE2-235C-08A4-4EB9D7C4E673}"/>
+              </a:ext>
+            </a:extLst>
+          </p:cNvPr>
+          <p:cNvPicPr>
+            <a:picLocks noChangeAspect="1"/>
+          </p:cNvPicPr>
+          <p:nvPr/>
+        </p:nvPicPr>
+        <p:blipFill rotWithShape="1">
+          <a:blip r:embed="rId3">
+            <a:extLst>
+              <a:ext uri="{28A0092B-C50C-407E-A947-70E740481C1C}">
+                <a14:useLocalDpi xmlns:a14="http://schemas.microsoft.com/office/drawing/2010/main" val="0"/>
+              </a:ext>
+            </a:extLst>
+          </a:blip>
+          <a:srcRect l="5000" t="2628" r="4722" b="10499"/>
+          <a:stretch/>
+        </p:blipFill>
+        <p:spPr>
+          <a:xfrm>
+            <a:off x="309710" y="540789"/>
+            <a:ext cx="11640312" cy="5336637"/>
+          </a:xfrm>
+          <a:prstGeom prst="rect">
+            <a:avLst/>
+          </a:prstGeom>
+        </p:spPr>
+      </p:pic>
+      <p:sp>
+        <p:nvSpPr>
+          <p:cNvPr id="15" name="Téglalap 14">
+            <a:extLst>
+              <a:ext uri="{FF2B5EF4-FFF2-40B4-BE49-F238E27FC236}">
+                <a16:creationId xmlns:a16="http://schemas.microsoft.com/office/drawing/2014/main" id="{6E35B874-8C1B-6ECA-0529-F58ADF3B98A8}"/>
+              </a:ext>
+            </a:extLst>
+          </p:cNvPr>
+          <p:cNvSpPr/>
+          <p:nvPr/>
+        </p:nvSpPr>
+        <p:spPr>
+          <a:xfrm>
+            <a:off x="1198645" y="5531562"/>
+            <a:ext cx="900059" cy="379730"/>
+          </a:xfrm>
+          <a:prstGeom prst="rect">
+            <a:avLst/>
+          </a:prstGeom>
+          <a:solidFill>
+            <a:srgbClr val="202020"/>
+          </a:solidFill>
+          <a:ln w="19050">
+            <a:solidFill>
+              <a:srgbClr val="6D6B5B"/>
+            </a:solidFill>
+          </a:ln>
+        </p:spPr>
+        <p:style>
+          <a:lnRef idx="2">
+            <a:schemeClr val="accent1">
+              <a:shade val="50000"/>
+            </a:schemeClr>
+          </a:lnRef>
+          <a:fillRef idx="1">
+            <a:schemeClr val="accent1"/>
+          </a:fillRef>
+          <a:effectRef idx="0">
+            <a:schemeClr val="accent1"/>
+          </a:effectRef>
+          <a:fontRef idx="minor">
+            <a:schemeClr val="lt1"/>
+          </a:fontRef>
+        </p:style>
+        <p:txBody>
+          <a:bodyPr rtlCol="0" anchor="ctr"/>
+          <a:lstStyle/>
+          <a:p>
+            <a:pPr algn="ctr"/>
+            <a:endParaRPr lang="hu-HU" sz="2000" dirty="0">
+              <a:solidFill>
+                <a:schemeClr val="bg1">
+                  <a:lumMod val="95000"/>
+                </a:schemeClr>
+              </a:solidFill>
+              <a:latin typeface="Agency FB" panose="020B0503020202020204" pitchFamily="34" charset="0"/>
+            </a:endParaRPr>
+          </a:p>
+        </p:txBody>
+      </p:sp>
+      <p:pic>
+        <p:nvPicPr>
+          <p:cNvPr id="17" name="Kép 16" descr="A képen szöveg, clipart, vektorgrafika látható&#10;&#10;Automatikusan generált leírás">
+            <a:extLst>
+              <a:ext uri="{FF2B5EF4-FFF2-40B4-BE49-F238E27FC236}">
+                <a16:creationId xmlns:a16="http://schemas.microsoft.com/office/drawing/2014/main" id="{34C4FE88-9D0E-BA35-90C4-6D675562E5E3}"/>
+              </a:ext>
+            </a:extLst>
+          </p:cNvPr>
+          <p:cNvPicPr>
+            <a:picLocks noChangeAspect="1"/>
+          </p:cNvPicPr>
+          <p:nvPr/>
+        </p:nvPicPr>
+        <p:blipFill>
+          <a:blip r:embed="rId4">
+            <a:extLst>
+              <a:ext uri="{28A0092B-C50C-407E-A947-70E740481C1C}">
+                <a14:useLocalDpi xmlns:a14="http://schemas.microsoft.com/office/drawing/2010/main" val="0"/>
+              </a:ext>
+            </a:extLst>
+          </a:blip>
+          <a:stretch>
+            <a:fillRect/>
+          </a:stretch>
+        </p:blipFill>
+        <p:spPr>
+          <a:xfrm flipH="1">
+            <a:off x="13302691" y="-337035"/>
+            <a:ext cx="744655" cy="1755648"/>
+          </a:xfrm>
+          <a:prstGeom prst="rect">
+            <a:avLst/>
+          </a:prstGeom>
+        </p:spPr>
+      </p:pic>
+      <p:pic>
+        <p:nvPicPr>
+          <p:cNvPr id="19" name="Kép 18">
+            <a:extLst>
+              <a:ext uri="{FF2B5EF4-FFF2-40B4-BE49-F238E27FC236}">
+                <a16:creationId xmlns:a16="http://schemas.microsoft.com/office/drawing/2014/main" id="{86A3088D-3E9A-8A65-F5E9-0067CDA1F674}"/>
+              </a:ext>
+            </a:extLst>
+          </p:cNvPr>
+          <p:cNvPicPr>
+            <a:picLocks noChangeAspect="1"/>
+          </p:cNvPicPr>
+          <p:nvPr/>
+        </p:nvPicPr>
+        <p:blipFill>
+          <a:blip r:embed="rId5">
+            <a:extLst>
+              <a:ext uri="{28A0092B-C50C-407E-A947-70E740481C1C}">
+                <a14:useLocalDpi xmlns:a14="http://schemas.microsoft.com/office/drawing/2010/main" val="0"/>
+              </a:ext>
+            </a:extLst>
+          </a:blip>
+          <a:stretch>
+            <a:fillRect/>
+          </a:stretch>
+        </p:blipFill>
+        <p:spPr>
+          <a:xfrm>
+            <a:off x="3231711" y="3505201"/>
+            <a:ext cx="743363" cy="1752600"/>
+          </a:xfrm>
+          <a:prstGeom prst="rect">
+            <a:avLst/>
+          </a:prstGeom>
+        </p:spPr>
+      </p:pic>
+      <p:pic>
+        <p:nvPicPr>
+          <p:cNvPr id="20" name="Kép 19">
+            <a:extLst>
+              <a:ext uri="{FF2B5EF4-FFF2-40B4-BE49-F238E27FC236}">
+                <a16:creationId xmlns:a16="http://schemas.microsoft.com/office/drawing/2014/main" id="{C4756DA0-74AD-E985-4A18-334FA2EC4E5A}"/>
+              </a:ext>
+            </a:extLst>
+          </p:cNvPr>
+          <p:cNvPicPr>
+            <a:picLocks noChangeAspect="1"/>
+          </p:cNvPicPr>
+          <p:nvPr/>
+        </p:nvPicPr>
+        <p:blipFill>
+          <a:blip r:embed="rId6">
+            <a:extLst>
+              <a:ext uri="{28A0092B-C50C-407E-A947-70E740481C1C}">
+                <a14:useLocalDpi xmlns:a14="http://schemas.microsoft.com/office/drawing/2010/main" val="0"/>
+              </a:ext>
+            </a:extLst>
+          </a:blip>
+          <a:stretch>
+            <a:fillRect/>
+          </a:stretch>
+        </p:blipFill>
+        <p:spPr>
+          <a:xfrm>
+            <a:off x="12930364" y="3025141"/>
+            <a:ext cx="744655" cy="1755648"/>
+          </a:xfrm>
+          <a:prstGeom prst="rect">
+            <a:avLst/>
+          </a:prstGeom>
+        </p:spPr>
+      </p:pic>
+      <p:pic>
+        <p:nvPicPr>
+          <p:cNvPr id="21" name="Kép 20" descr="A képen szöveg, clipart, vektorgrafika látható&#10;&#10;Automatikusan generált leírás">
+            <a:extLst>
+              <a:ext uri="{FF2B5EF4-FFF2-40B4-BE49-F238E27FC236}">
+                <a16:creationId xmlns:a16="http://schemas.microsoft.com/office/drawing/2014/main" id="{94F20169-ED3C-1660-37B8-6E722835F729}"/>
+              </a:ext>
+            </a:extLst>
+          </p:cNvPr>
+          <p:cNvPicPr>
+            <a:picLocks noChangeAspect="1"/>
+          </p:cNvPicPr>
+          <p:nvPr/>
+        </p:nvPicPr>
+        <p:blipFill>
+          <a:blip r:embed="rId7">
+            <a:extLst>
+              <a:ext uri="{28A0092B-C50C-407E-A947-70E740481C1C}">
+                <a14:useLocalDpi xmlns:a14="http://schemas.microsoft.com/office/drawing/2010/main" val="0"/>
+              </a:ext>
+            </a:extLst>
+          </a:blip>
+          <a:stretch>
+            <a:fillRect/>
+          </a:stretch>
+        </p:blipFill>
+        <p:spPr>
+          <a:xfrm flipH="1">
+            <a:off x="14469244" y="540789"/>
+            <a:ext cx="744655" cy="1755648"/>
+          </a:xfrm>
+          <a:prstGeom prst="rect">
+            <a:avLst/>
+          </a:prstGeom>
+        </p:spPr>
+      </p:pic>
+      <p:pic>
+        <p:nvPicPr>
+          <p:cNvPr id="22" name="Kép 21">
+            <a:extLst>
+              <a:ext uri="{FF2B5EF4-FFF2-40B4-BE49-F238E27FC236}">
+                <a16:creationId xmlns:a16="http://schemas.microsoft.com/office/drawing/2014/main" id="{9E483CBB-6701-7461-C65B-9E95EE56AB04}"/>
+              </a:ext>
+            </a:extLst>
+          </p:cNvPr>
+          <p:cNvPicPr>
+            <a:picLocks noChangeAspect="1"/>
+          </p:cNvPicPr>
+          <p:nvPr/>
+        </p:nvPicPr>
+        <p:blipFill>
+          <a:blip r:embed="rId8">
+            <a:extLst>
+              <a:ext uri="{28A0092B-C50C-407E-A947-70E740481C1C}">
+                <a14:useLocalDpi xmlns:a14="http://schemas.microsoft.com/office/drawing/2010/main" val="0"/>
+              </a:ext>
+            </a:extLst>
+          </a:blip>
+          <a:stretch>
+            <a:fillRect/>
+          </a:stretch>
+        </p:blipFill>
+        <p:spPr>
+          <a:xfrm>
+            <a:off x="-2752028" y="1818780"/>
+            <a:ext cx="1141745" cy="1755648"/>
+          </a:xfrm>
+          <a:prstGeom prst="rect">
+            <a:avLst/>
+          </a:prstGeom>
+        </p:spPr>
+      </p:pic>
+    </p:spTree>
+    <p:extLst>
+      <p:ext uri="{BB962C8B-B14F-4D97-AF65-F5344CB8AC3E}">
+        <p14:creationId xmlns:p14="http://schemas.microsoft.com/office/powerpoint/2010/main" val="1198123177"/>
       </p:ext>
     </p:extLst>
   </p:cSld>

</xml_diff>

<commit_message>
Creating the Victory background
</commit_message>
<xml_diff>
--- a/Pics/Bemutato.pptx
+++ b/Pics/Bemutato.pptx
@@ -6,9 +6,10 @@
   </p:sldMasterIdLst>
   <p:sldIdLst>
     <p:sldId id="256" r:id="rId2"/>
-    <p:sldId id="258" r:id="rId3"/>
-    <p:sldId id="259" r:id="rId4"/>
-    <p:sldId id="260" r:id="rId5"/>
+    <p:sldId id="261" r:id="rId3"/>
+    <p:sldId id="258" r:id="rId4"/>
+    <p:sldId id="259" r:id="rId5"/>
+    <p:sldId id="260" r:id="rId6"/>
   </p:sldIdLst>
   <p:sldSz cx="12192000" cy="6858000"/>
   <p:notesSz cx="6858000" cy="9144000"/>
@@ -3797,7 +3798,7 @@
     <p:bg>
       <p:bgPr>
         <a:solidFill>
-          <a:srgbClr val="000000"/>
+          <a:srgbClr val="F5FFFD"/>
         </a:solidFill>
         <a:effectLst/>
       </p:bgPr>
@@ -3818,10 +3819,10 @@
       </p:grpSpPr>
       <p:pic>
         <p:nvPicPr>
-          <p:cNvPr id="21" name="Kép 20">
-            <a:extLst>
-              <a:ext uri="{FF2B5EF4-FFF2-40B4-BE49-F238E27FC236}">
-                <a16:creationId xmlns:a16="http://schemas.microsoft.com/office/drawing/2014/main" id="{35182C24-A003-A11B-3B49-9A12B6A104E7}"/>
+          <p:cNvPr id="11" name="Kép 10">
+            <a:extLst>
+              <a:ext uri="{FF2B5EF4-FFF2-40B4-BE49-F238E27FC236}">
+                <a16:creationId xmlns:a16="http://schemas.microsoft.com/office/drawing/2014/main" id="{0D1FF6BD-C0BB-9776-C42E-D1AB65B45604}"/>
               </a:ext>
             </a:extLst>
           </p:cNvPr>
@@ -3838,7 +3839,7 @@
         </p:blipFill>
         <p:spPr>
           <a:xfrm>
-            <a:off x="0" y="0"/>
+            <a:off x="0" y="-1"/>
             <a:ext cx="12192000" cy="6858000"/>
           </a:xfrm>
           <a:prstGeom prst="rect">
@@ -3848,10 +3849,10 @@
       </p:pic>
       <p:pic>
         <p:nvPicPr>
-          <p:cNvPr id="20" name="Kép 19">
-            <a:extLst>
-              <a:ext uri="{FF2B5EF4-FFF2-40B4-BE49-F238E27FC236}">
-                <a16:creationId xmlns:a16="http://schemas.microsoft.com/office/drawing/2014/main" id="{328F442B-77FB-6EF6-560A-48F61E833533}"/>
+          <p:cNvPr id="5" name="Kép 4" descr="A képen szöveg látható&#10;&#10;Automatikusan generált leírás">
+            <a:extLst>
+              <a:ext uri="{FF2B5EF4-FFF2-40B4-BE49-F238E27FC236}">
+                <a16:creationId xmlns:a16="http://schemas.microsoft.com/office/drawing/2014/main" id="{2B037D6D-B7BE-E0D2-B11F-E2F701C33E13}"/>
               </a:ext>
             </a:extLst>
           </p:cNvPr>
@@ -3860,7 +3861,7 @@
           </p:cNvPicPr>
           <p:nvPr/>
         </p:nvPicPr>
-        <p:blipFill rotWithShape="1">
+        <p:blipFill>
           <a:blip r:embed="rId3">
             <a:extLst>
               <a:ext uri="{28A0092B-C50C-407E-A947-70E740481C1C}">
@@ -3868,86 +3869,26 @@
               </a:ext>
             </a:extLst>
           </a:blip>
-          <a:srcRect l="5000" t="2336" r="4861" b="10499"/>
-          <a:stretch/>
+          <a:stretch>
+            <a:fillRect/>
+          </a:stretch>
         </p:blipFill>
         <p:spPr>
           <a:xfrm>
-            <a:off x="309710" y="531564"/>
-            <a:ext cx="11640312" cy="5362795"/>
+            <a:off x="952500" y="0"/>
+            <a:ext cx="10287000" cy="6858000"/>
           </a:xfrm>
           <a:prstGeom prst="rect">
             <a:avLst/>
           </a:prstGeom>
         </p:spPr>
       </p:pic>
-      <p:sp>
-        <p:nvSpPr>
-          <p:cNvPr id="8" name="Téglalap 7">
-            <a:extLst>
-              <a:ext uri="{FF2B5EF4-FFF2-40B4-BE49-F238E27FC236}">
-                <a16:creationId xmlns:a16="http://schemas.microsoft.com/office/drawing/2014/main" id="{B50761D4-9B34-5B00-D130-69971024FFA3}"/>
-              </a:ext>
-            </a:extLst>
-          </p:cNvPr>
-          <p:cNvSpPr/>
-          <p:nvPr/>
-        </p:nvSpPr>
-        <p:spPr>
-          <a:xfrm>
-            <a:off x="1198645" y="5531562"/>
-            <a:ext cx="900059" cy="379730"/>
-          </a:xfrm>
-          <a:prstGeom prst="rect">
-            <a:avLst/>
-          </a:prstGeom>
-          <a:solidFill>
-            <a:srgbClr val="202020"/>
-          </a:solidFill>
-          <a:ln w="19050">
-            <a:solidFill>
-              <a:srgbClr val="6D6B5B"/>
-            </a:solidFill>
-          </a:ln>
-        </p:spPr>
-        <p:style>
-          <a:lnRef idx="2">
-            <a:schemeClr val="accent1">
-              <a:shade val="50000"/>
-            </a:schemeClr>
-          </a:lnRef>
-          <a:fillRef idx="1">
-            <a:schemeClr val="accent1"/>
-          </a:fillRef>
-          <a:effectRef idx="0">
-            <a:schemeClr val="accent1"/>
-          </a:effectRef>
-          <a:fontRef idx="minor">
-            <a:schemeClr val="lt1"/>
-          </a:fontRef>
-        </p:style>
-        <p:txBody>
-          <a:bodyPr rtlCol="0" anchor="ctr"/>
-          <a:lstStyle/>
-          <a:p>
-            <a:pPr algn="ctr"/>
-            <a:endParaRPr lang="hu-HU" sz="2000" dirty="0">
-              <a:solidFill>
-                <a:schemeClr val="bg1">
-                  <a:lumMod val="95000"/>
-                </a:schemeClr>
-              </a:solidFill>
-              <a:latin typeface="Agency FB" panose="020B0503020202020204" pitchFamily="34" charset="0"/>
-            </a:endParaRPr>
-          </a:p>
-        </p:txBody>
-      </p:sp>
       <p:pic>
         <p:nvPicPr>
-          <p:cNvPr id="12" name="Kép 11">
-            <a:extLst>
-              <a:ext uri="{FF2B5EF4-FFF2-40B4-BE49-F238E27FC236}">
-                <a16:creationId xmlns:a16="http://schemas.microsoft.com/office/drawing/2014/main" id="{D62F8703-DE4E-BFF3-800A-6C0FE7EC562D}"/>
+          <p:cNvPr id="7" name="Kép 6">
+            <a:extLst>
+              <a:ext uri="{FF2B5EF4-FFF2-40B4-BE49-F238E27FC236}">
+                <a16:creationId xmlns:a16="http://schemas.microsoft.com/office/drawing/2014/main" id="{B38732A8-EB6F-B329-5C57-659F2097791D}"/>
               </a:ext>
             </a:extLst>
           </p:cNvPr>
@@ -3970,8 +3911,8 @@
         </p:blipFill>
         <p:spPr>
           <a:xfrm>
-            <a:off x="3231711" y="3505201"/>
-            <a:ext cx="743363" cy="1752600"/>
+            <a:off x="2077091" y="3020614"/>
+            <a:ext cx="2016607" cy="2683639"/>
           </a:xfrm>
           <a:prstGeom prst="rect">
             <a:avLst/>
@@ -3980,10 +3921,10 @@
       </p:pic>
       <p:pic>
         <p:nvPicPr>
-          <p:cNvPr id="14" name="Kép 13">
-            <a:extLst>
-              <a:ext uri="{FF2B5EF4-FFF2-40B4-BE49-F238E27FC236}">
-                <a16:creationId xmlns:a16="http://schemas.microsoft.com/office/drawing/2014/main" id="{A95D59B8-16A6-CB8F-1468-6680002C148D}"/>
+          <p:cNvPr id="9" name="Kép 8">
+            <a:extLst>
+              <a:ext uri="{FF2B5EF4-FFF2-40B4-BE49-F238E27FC236}">
+                <a16:creationId xmlns:a16="http://schemas.microsoft.com/office/drawing/2014/main" id="{AF1786F5-AC55-9237-9B13-8085B9CDE99F}"/>
               </a:ext>
             </a:extLst>
           </p:cNvPr>
@@ -4005,117 +3946,9 @@
           </a:stretch>
         </p:blipFill>
         <p:spPr>
-          <a:xfrm>
-            <a:off x="13327256" y="533936"/>
-            <a:ext cx="744655" cy="1755648"/>
-          </a:xfrm>
-          <a:prstGeom prst="rect">
-            <a:avLst/>
-          </a:prstGeom>
-        </p:spPr>
-      </p:pic>
-      <p:pic>
-        <p:nvPicPr>
-          <p:cNvPr id="16" name="Kép 15" descr="A képen szöveg, clipart, vektorgrafika látható&#10;&#10;Automatikusan generált leírás">
-            <a:extLst>
-              <a:ext uri="{FF2B5EF4-FFF2-40B4-BE49-F238E27FC236}">
-                <a16:creationId xmlns:a16="http://schemas.microsoft.com/office/drawing/2014/main" id="{4A3EF4D2-1502-ECE5-CDBD-339E8A956204}"/>
-              </a:ext>
-            </a:extLst>
-          </p:cNvPr>
-          <p:cNvPicPr>
-            <a:picLocks noChangeAspect="1"/>
-          </p:cNvPicPr>
-          <p:nvPr/>
-        </p:nvPicPr>
-        <p:blipFill>
-          <a:blip r:embed="rId6">
-            <a:extLst>
-              <a:ext uri="{28A0092B-C50C-407E-A947-70E740481C1C}">
-                <a14:useLocalDpi xmlns:a14="http://schemas.microsoft.com/office/drawing/2010/main" val="0"/>
-              </a:ext>
-            </a:extLst>
-          </a:blip>
-          <a:stretch>
-            <a:fillRect/>
-          </a:stretch>
-        </p:blipFill>
-        <p:spPr>
           <a:xfrm flipH="1">
-            <a:off x="15434818" y="2335137"/>
-            <a:ext cx="744655" cy="1755648"/>
-          </a:xfrm>
-          <a:prstGeom prst="rect">
-            <a:avLst/>
-          </a:prstGeom>
-        </p:spPr>
-      </p:pic>
-      <p:pic>
-        <p:nvPicPr>
-          <p:cNvPr id="18" name="Kép 17">
-            <a:extLst>
-              <a:ext uri="{FF2B5EF4-FFF2-40B4-BE49-F238E27FC236}">
-                <a16:creationId xmlns:a16="http://schemas.microsoft.com/office/drawing/2014/main" id="{B6BB7779-FBDB-D4E0-D1A7-6E7576966D02}"/>
-              </a:ext>
-            </a:extLst>
-          </p:cNvPr>
-          <p:cNvPicPr>
-            <a:picLocks noChangeAspect="1"/>
-          </p:cNvPicPr>
-          <p:nvPr/>
-        </p:nvPicPr>
-        <p:blipFill>
-          <a:blip r:embed="rId7">
-            <a:extLst>
-              <a:ext uri="{28A0092B-C50C-407E-A947-70E740481C1C}">
-                <a14:useLocalDpi xmlns:a14="http://schemas.microsoft.com/office/drawing/2010/main" val="0"/>
-              </a:ext>
-            </a:extLst>
-          </a:blip>
-          <a:stretch>
-            <a:fillRect/>
-          </a:stretch>
-        </p:blipFill>
-        <p:spPr>
-          <a:xfrm>
-            <a:off x="-1631916" y="2551176"/>
-            <a:ext cx="1141745" cy="1755648"/>
-          </a:xfrm>
-          <a:prstGeom prst="rect">
-            <a:avLst/>
-          </a:prstGeom>
-        </p:spPr>
-      </p:pic>
-      <p:pic>
-        <p:nvPicPr>
-          <p:cNvPr id="22" name="Kép 21">
-            <a:extLst>
-              <a:ext uri="{FF2B5EF4-FFF2-40B4-BE49-F238E27FC236}">
-                <a16:creationId xmlns:a16="http://schemas.microsoft.com/office/drawing/2014/main" id="{E4F92A3E-3951-6616-04EF-61E65664139A}"/>
-              </a:ext>
-            </a:extLst>
-          </p:cNvPr>
-          <p:cNvPicPr>
-            <a:picLocks noChangeAspect="1"/>
-          </p:cNvPicPr>
-          <p:nvPr/>
-        </p:nvPicPr>
-        <p:blipFill>
-          <a:blip r:embed="rId7">
-            <a:extLst>
-              <a:ext uri="{28A0092B-C50C-407E-A947-70E740481C1C}">
-                <a14:useLocalDpi xmlns:a14="http://schemas.microsoft.com/office/drawing/2010/main" val="0"/>
-              </a:ext>
-            </a:extLst>
-          </a:blip>
-          <a:stretch>
-            <a:fillRect/>
-          </a:stretch>
-        </p:blipFill>
-        <p:spPr>
-          <a:xfrm flipH="1">
-            <a:off x="7053472" y="3513668"/>
-            <a:ext cx="1141745" cy="1755648"/>
+            <a:off x="8584945" y="3020614"/>
+            <a:ext cx="1698536" cy="2611819"/>
           </a:xfrm>
           <a:prstGeom prst="rect">
             <a:avLst/>
@@ -4125,7 +3958,7 @@
     </p:spTree>
     <p:extLst>
       <p:ext uri="{BB962C8B-B14F-4D97-AF65-F5344CB8AC3E}">
-        <p14:creationId xmlns:p14="http://schemas.microsoft.com/office/powerpoint/2010/main" val="1078019550"/>
+        <p14:creationId xmlns:p14="http://schemas.microsoft.com/office/powerpoint/2010/main" val="2538213599"/>
       </p:ext>
     </p:extLst>
   </p:cSld>
@@ -4162,10 +3995,10 @@
       </p:grpSpPr>
       <p:pic>
         <p:nvPicPr>
-          <p:cNvPr id="13" name="Kép 12">
-            <a:extLst>
-              <a:ext uri="{FF2B5EF4-FFF2-40B4-BE49-F238E27FC236}">
-                <a16:creationId xmlns:a16="http://schemas.microsoft.com/office/drawing/2014/main" id="{409B8F5C-E785-9FD2-8E3E-C516C81D505B}"/>
+          <p:cNvPr id="21" name="Kép 20">
+            <a:extLst>
+              <a:ext uri="{FF2B5EF4-FFF2-40B4-BE49-F238E27FC236}">
+                <a16:creationId xmlns:a16="http://schemas.microsoft.com/office/drawing/2014/main" id="{35182C24-A003-A11B-3B49-9A12B6A104E7}"/>
               </a:ext>
             </a:extLst>
           </p:cNvPr>
@@ -4192,10 +4025,10 @@
       </p:pic>
       <p:pic>
         <p:nvPicPr>
-          <p:cNvPr id="9" name="Kép 8">
-            <a:extLst>
-              <a:ext uri="{FF2B5EF4-FFF2-40B4-BE49-F238E27FC236}">
-                <a16:creationId xmlns:a16="http://schemas.microsoft.com/office/drawing/2014/main" id="{8EE36B59-9AF8-B5B8-4800-6C542DF3170C}"/>
+          <p:cNvPr id="20" name="Kép 19">
+            <a:extLst>
+              <a:ext uri="{FF2B5EF4-FFF2-40B4-BE49-F238E27FC236}">
+                <a16:creationId xmlns:a16="http://schemas.microsoft.com/office/drawing/2014/main" id="{328F442B-77FB-6EF6-560A-48F61E833533}"/>
               </a:ext>
             </a:extLst>
           </p:cNvPr>
@@ -4212,13 +4045,13 @@
               </a:ext>
             </a:extLst>
           </a:blip>
-          <a:srcRect l="5077" t="2834" r="4693" b="10705"/>
+          <a:srcRect l="5000" t="2336" r="4861" b="10499"/>
           <a:stretch/>
         </p:blipFill>
         <p:spPr>
           <a:xfrm>
-            <a:off x="315119" y="557713"/>
-            <a:ext cx="11663360" cy="5324578"/>
+            <a:off x="309710" y="531564"/>
+            <a:ext cx="11640312" cy="5362795"/>
           </a:xfrm>
           <a:prstGeom prst="rect">
             <a:avLst/>
@@ -4227,10 +4060,10 @@
       </p:pic>
       <p:sp>
         <p:nvSpPr>
-          <p:cNvPr id="17" name="Téglalap 16">
-            <a:extLst>
-              <a:ext uri="{FF2B5EF4-FFF2-40B4-BE49-F238E27FC236}">
-                <a16:creationId xmlns:a16="http://schemas.microsoft.com/office/drawing/2014/main" id="{F4B995A4-7A41-33F9-8339-4DEA391F7C4D}"/>
+          <p:cNvPr id="8" name="Téglalap 7">
+            <a:extLst>
+              <a:ext uri="{FF2B5EF4-FFF2-40B4-BE49-F238E27FC236}">
+                <a16:creationId xmlns:a16="http://schemas.microsoft.com/office/drawing/2014/main" id="{B50761D4-9B34-5B00-D130-69971024FFA3}"/>
               </a:ext>
             </a:extLst>
           </p:cNvPr>
@@ -4288,6 +4121,350 @@
       </p:sp>
       <p:pic>
         <p:nvPicPr>
+          <p:cNvPr id="12" name="Kép 11">
+            <a:extLst>
+              <a:ext uri="{FF2B5EF4-FFF2-40B4-BE49-F238E27FC236}">
+                <a16:creationId xmlns:a16="http://schemas.microsoft.com/office/drawing/2014/main" id="{D62F8703-DE4E-BFF3-800A-6C0FE7EC562D}"/>
+              </a:ext>
+            </a:extLst>
+          </p:cNvPr>
+          <p:cNvPicPr>
+            <a:picLocks noChangeAspect="1"/>
+          </p:cNvPicPr>
+          <p:nvPr/>
+        </p:nvPicPr>
+        <p:blipFill>
+          <a:blip r:embed="rId4">
+            <a:extLst>
+              <a:ext uri="{28A0092B-C50C-407E-A947-70E740481C1C}">
+                <a14:useLocalDpi xmlns:a14="http://schemas.microsoft.com/office/drawing/2010/main" val="0"/>
+              </a:ext>
+            </a:extLst>
+          </a:blip>
+          <a:stretch>
+            <a:fillRect/>
+          </a:stretch>
+        </p:blipFill>
+        <p:spPr>
+          <a:xfrm>
+            <a:off x="3231711" y="3505201"/>
+            <a:ext cx="743363" cy="1752600"/>
+          </a:xfrm>
+          <a:prstGeom prst="rect">
+            <a:avLst/>
+          </a:prstGeom>
+        </p:spPr>
+      </p:pic>
+      <p:pic>
+        <p:nvPicPr>
+          <p:cNvPr id="14" name="Kép 13">
+            <a:extLst>
+              <a:ext uri="{FF2B5EF4-FFF2-40B4-BE49-F238E27FC236}">
+                <a16:creationId xmlns:a16="http://schemas.microsoft.com/office/drawing/2014/main" id="{A95D59B8-16A6-CB8F-1468-6680002C148D}"/>
+              </a:ext>
+            </a:extLst>
+          </p:cNvPr>
+          <p:cNvPicPr>
+            <a:picLocks noChangeAspect="1"/>
+          </p:cNvPicPr>
+          <p:nvPr/>
+        </p:nvPicPr>
+        <p:blipFill>
+          <a:blip r:embed="rId5">
+            <a:extLst>
+              <a:ext uri="{28A0092B-C50C-407E-A947-70E740481C1C}">
+                <a14:useLocalDpi xmlns:a14="http://schemas.microsoft.com/office/drawing/2010/main" val="0"/>
+              </a:ext>
+            </a:extLst>
+          </a:blip>
+          <a:stretch>
+            <a:fillRect/>
+          </a:stretch>
+        </p:blipFill>
+        <p:spPr>
+          <a:xfrm>
+            <a:off x="13327256" y="533936"/>
+            <a:ext cx="744655" cy="1755648"/>
+          </a:xfrm>
+          <a:prstGeom prst="rect">
+            <a:avLst/>
+          </a:prstGeom>
+        </p:spPr>
+      </p:pic>
+      <p:pic>
+        <p:nvPicPr>
+          <p:cNvPr id="16" name="Kép 15" descr="A képen szöveg, clipart, vektorgrafika látható&#10;&#10;Automatikusan generált leírás">
+            <a:extLst>
+              <a:ext uri="{FF2B5EF4-FFF2-40B4-BE49-F238E27FC236}">
+                <a16:creationId xmlns:a16="http://schemas.microsoft.com/office/drawing/2014/main" id="{4A3EF4D2-1502-ECE5-CDBD-339E8A956204}"/>
+              </a:ext>
+            </a:extLst>
+          </p:cNvPr>
+          <p:cNvPicPr>
+            <a:picLocks noChangeAspect="1"/>
+          </p:cNvPicPr>
+          <p:nvPr/>
+        </p:nvPicPr>
+        <p:blipFill>
+          <a:blip r:embed="rId6">
+            <a:extLst>
+              <a:ext uri="{28A0092B-C50C-407E-A947-70E740481C1C}">
+                <a14:useLocalDpi xmlns:a14="http://schemas.microsoft.com/office/drawing/2010/main" val="0"/>
+              </a:ext>
+            </a:extLst>
+          </a:blip>
+          <a:stretch>
+            <a:fillRect/>
+          </a:stretch>
+        </p:blipFill>
+        <p:spPr>
+          <a:xfrm flipH="1">
+            <a:off x="15434818" y="2335137"/>
+            <a:ext cx="744655" cy="1755648"/>
+          </a:xfrm>
+          <a:prstGeom prst="rect">
+            <a:avLst/>
+          </a:prstGeom>
+        </p:spPr>
+      </p:pic>
+      <p:pic>
+        <p:nvPicPr>
+          <p:cNvPr id="18" name="Kép 17">
+            <a:extLst>
+              <a:ext uri="{FF2B5EF4-FFF2-40B4-BE49-F238E27FC236}">
+                <a16:creationId xmlns:a16="http://schemas.microsoft.com/office/drawing/2014/main" id="{B6BB7779-FBDB-D4E0-D1A7-6E7576966D02}"/>
+              </a:ext>
+            </a:extLst>
+          </p:cNvPr>
+          <p:cNvPicPr>
+            <a:picLocks noChangeAspect="1"/>
+          </p:cNvPicPr>
+          <p:nvPr/>
+        </p:nvPicPr>
+        <p:blipFill>
+          <a:blip r:embed="rId7">
+            <a:extLst>
+              <a:ext uri="{28A0092B-C50C-407E-A947-70E740481C1C}">
+                <a14:useLocalDpi xmlns:a14="http://schemas.microsoft.com/office/drawing/2010/main" val="0"/>
+              </a:ext>
+            </a:extLst>
+          </a:blip>
+          <a:stretch>
+            <a:fillRect/>
+          </a:stretch>
+        </p:blipFill>
+        <p:spPr>
+          <a:xfrm>
+            <a:off x="-1631916" y="2551176"/>
+            <a:ext cx="1141745" cy="1755648"/>
+          </a:xfrm>
+          <a:prstGeom prst="rect">
+            <a:avLst/>
+          </a:prstGeom>
+        </p:spPr>
+      </p:pic>
+      <p:pic>
+        <p:nvPicPr>
+          <p:cNvPr id="22" name="Kép 21">
+            <a:extLst>
+              <a:ext uri="{FF2B5EF4-FFF2-40B4-BE49-F238E27FC236}">
+                <a16:creationId xmlns:a16="http://schemas.microsoft.com/office/drawing/2014/main" id="{E4F92A3E-3951-6616-04EF-61E65664139A}"/>
+              </a:ext>
+            </a:extLst>
+          </p:cNvPr>
+          <p:cNvPicPr>
+            <a:picLocks noChangeAspect="1"/>
+          </p:cNvPicPr>
+          <p:nvPr/>
+        </p:nvPicPr>
+        <p:blipFill>
+          <a:blip r:embed="rId7">
+            <a:extLst>
+              <a:ext uri="{28A0092B-C50C-407E-A947-70E740481C1C}">
+                <a14:useLocalDpi xmlns:a14="http://schemas.microsoft.com/office/drawing/2010/main" val="0"/>
+              </a:ext>
+            </a:extLst>
+          </a:blip>
+          <a:stretch>
+            <a:fillRect/>
+          </a:stretch>
+        </p:blipFill>
+        <p:spPr>
+          <a:xfrm flipH="1">
+            <a:off x="7053472" y="3513668"/>
+            <a:ext cx="1141745" cy="1755648"/>
+          </a:xfrm>
+          <a:prstGeom prst="rect">
+            <a:avLst/>
+          </a:prstGeom>
+        </p:spPr>
+      </p:pic>
+    </p:spTree>
+    <p:extLst>
+      <p:ext uri="{BB962C8B-B14F-4D97-AF65-F5344CB8AC3E}">
+        <p14:creationId xmlns:p14="http://schemas.microsoft.com/office/powerpoint/2010/main" val="1078019550"/>
+      </p:ext>
+    </p:extLst>
+  </p:cSld>
+  <p:clrMapOvr>
+    <a:masterClrMapping/>
+  </p:clrMapOvr>
+</p:sld>
+</file>
+
+<file path=ppt/slides/slide4.xml><?xml version="1.0" encoding="utf-8"?>
+<p:sld xmlns:a="http://schemas.openxmlformats.org/drawingml/2006/main" xmlns:r="http://schemas.openxmlformats.org/officeDocument/2006/relationships" xmlns:p="http://schemas.openxmlformats.org/presentationml/2006/main">
+  <p:cSld>
+    <p:bg>
+      <p:bgPr>
+        <a:solidFill>
+          <a:srgbClr val="000000"/>
+        </a:solidFill>
+        <a:effectLst/>
+      </p:bgPr>
+    </p:bg>
+    <p:spTree>
+      <p:nvGrpSpPr>
+        <p:cNvPr id="1" name=""/>
+        <p:cNvGrpSpPr/>
+        <p:nvPr/>
+      </p:nvGrpSpPr>
+      <p:grpSpPr>
+        <a:xfrm>
+          <a:off x="0" y="0"/>
+          <a:ext cx="0" cy="0"/>
+          <a:chOff x="0" y="0"/>
+          <a:chExt cx="0" cy="0"/>
+        </a:xfrm>
+      </p:grpSpPr>
+      <p:pic>
+        <p:nvPicPr>
+          <p:cNvPr id="13" name="Kép 12">
+            <a:extLst>
+              <a:ext uri="{FF2B5EF4-FFF2-40B4-BE49-F238E27FC236}">
+                <a16:creationId xmlns:a16="http://schemas.microsoft.com/office/drawing/2014/main" id="{409B8F5C-E785-9FD2-8E3E-C516C81D505B}"/>
+              </a:ext>
+            </a:extLst>
+          </p:cNvPr>
+          <p:cNvPicPr>
+            <a:picLocks noChangeAspect="1"/>
+          </p:cNvPicPr>
+          <p:nvPr/>
+        </p:nvPicPr>
+        <p:blipFill>
+          <a:blip r:embed="rId2"/>
+          <a:stretch>
+            <a:fillRect/>
+          </a:stretch>
+        </p:blipFill>
+        <p:spPr>
+          <a:xfrm>
+            <a:off x="0" y="0"/>
+            <a:ext cx="12192000" cy="6858000"/>
+          </a:xfrm>
+          <a:prstGeom prst="rect">
+            <a:avLst/>
+          </a:prstGeom>
+        </p:spPr>
+      </p:pic>
+      <p:pic>
+        <p:nvPicPr>
+          <p:cNvPr id="9" name="Kép 8">
+            <a:extLst>
+              <a:ext uri="{FF2B5EF4-FFF2-40B4-BE49-F238E27FC236}">
+                <a16:creationId xmlns:a16="http://schemas.microsoft.com/office/drawing/2014/main" id="{8EE36B59-9AF8-B5B8-4800-6C542DF3170C}"/>
+              </a:ext>
+            </a:extLst>
+          </p:cNvPr>
+          <p:cNvPicPr>
+            <a:picLocks noChangeAspect="1"/>
+          </p:cNvPicPr>
+          <p:nvPr/>
+        </p:nvPicPr>
+        <p:blipFill rotWithShape="1">
+          <a:blip r:embed="rId3">
+            <a:extLst>
+              <a:ext uri="{28A0092B-C50C-407E-A947-70E740481C1C}">
+                <a14:useLocalDpi xmlns:a14="http://schemas.microsoft.com/office/drawing/2010/main" val="0"/>
+              </a:ext>
+            </a:extLst>
+          </a:blip>
+          <a:srcRect l="5077" t="2834" r="4693" b="10705"/>
+          <a:stretch/>
+        </p:blipFill>
+        <p:spPr>
+          <a:xfrm>
+            <a:off x="315119" y="557713"/>
+            <a:ext cx="11663360" cy="5324578"/>
+          </a:xfrm>
+          <a:prstGeom prst="rect">
+            <a:avLst/>
+          </a:prstGeom>
+        </p:spPr>
+      </p:pic>
+      <p:sp>
+        <p:nvSpPr>
+          <p:cNvPr id="17" name="Téglalap 16">
+            <a:extLst>
+              <a:ext uri="{FF2B5EF4-FFF2-40B4-BE49-F238E27FC236}">
+                <a16:creationId xmlns:a16="http://schemas.microsoft.com/office/drawing/2014/main" id="{F4B995A4-7A41-33F9-8339-4DEA391F7C4D}"/>
+              </a:ext>
+            </a:extLst>
+          </p:cNvPr>
+          <p:cNvSpPr/>
+          <p:nvPr/>
+        </p:nvSpPr>
+        <p:spPr>
+          <a:xfrm>
+            <a:off x="1198645" y="5531562"/>
+            <a:ext cx="900059" cy="379730"/>
+          </a:xfrm>
+          <a:prstGeom prst="rect">
+            <a:avLst/>
+          </a:prstGeom>
+          <a:solidFill>
+            <a:srgbClr val="202020"/>
+          </a:solidFill>
+          <a:ln w="19050">
+            <a:solidFill>
+              <a:srgbClr val="6D6B5B"/>
+            </a:solidFill>
+          </a:ln>
+        </p:spPr>
+        <p:style>
+          <a:lnRef idx="2">
+            <a:schemeClr val="accent1">
+              <a:shade val="50000"/>
+            </a:schemeClr>
+          </a:lnRef>
+          <a:fillRef idx="1">
+            <a:schemeClr val="accent1"/>
+          </a:fillRef>
+          <a:effectRef idx="0">
+            <a:schemeClr val="accent1"/>
+          </a:effectRef>
+          <a:fontRef idx="minor">
+            <a:schemeClr val="lt1"/>
+          </a:fontRef>
+        </p:style>
+        <p:txBody>
+          <a:bodyPr rtlCol="0" anchor="ctr"/>
+          <a:lstStyle/>
+          <a:p>
+            <a:pPr algn="ctr"/>
+            <a:endParaRPr lang="hu-HU" sz="2000" dirty="0">
+              <a:solidFill>
+                <a:schemeClr val="bg1">
+                  <a:lumMod val="95000"/>
+                </a:schemeClr>
+              </a:solidFill>
+              <a:latin typeface="Agency FB" panose="020B0503020202020204" pitchFamily="34" charset="0"/>
+            </a:endParaRPr>
+          </a:p>
+        </p:txBody>
+      </p:sp>
+      <p:pic>
+        <p:nvPicPr>
           <p:cNvPr id="19" name="Kép 18" descr="A képen szöveg, clipart, vektorgrafika látható&#10;&#10;Automatikusan generált leírás">
             <a:extLst>
               <a:ext uri="{FF2B5EF4-FFF2-40B4-BE49-F238E27FC236}">
@@ -4479,7 +4656,7 @@
 </p:sld>
 </file>
 
-<file path=ppt/slides/slide4.xml><?xml version="1.0" encoding="utf-8"?>
+<file path=ppt/slides/slide5.xml><?xml version="1.0" encoding="utf-8"?>
 <p:sld xmlns:a="http://schemas.openxmlformats.org/drawingml/2006/main" xmlns:r="http://schemas.openxmlformats.org/officeDocument/2006/relationships" xmlns:p="http://schemas.openxmlformats.org/presentationml/2006/main">
   <p:cSld>
     <p:bg>

</xml_diff>

<commit_message>
Changing the Victory background
</commit_message>
<xml_diff>
--- a/Pics/Bemutato.pptx
+++ b/Pics/Bemutato.pptx
@@ -3955,6 +3955,36 @@
           </a:prstGeom>
         </p:spPr>
       </p:pic>
+      <p:pic>
+        <p:nvPicPr>
+          <p:cNvPr id="6" name="Kép 5">
+            <a:extLst>
+              <a:ext uri="{FF2B5EF4-FFF2-40B4-BE49-F238E27FC236}">
+                <a16:creationId xmlns:a16="http://schemas.microsoft.com/office/drawing/2014/main" id="{EE3AC968-C89D-1124-BF19-1EA92D923EB4}"/>
+              </a:ext>
+            </a:extLst>
+          </p:cNvPr>
+          <p:cNvPicPr>
+            <a:picLocks noChangeAspect="1"/>
+          </p:cNvPicPr>
+          <p:nvPr/>
+        </p:nvPicPr>
+        <p:blipFill>
+          <a:blip r:embed="rId6"/>
+          <a:stretch>
+            <a:fillRect/>
+          </a:stretch>
+        </p:blipFill>
+        <p:spPr>
+          <a:xfrm>
+            <a:off x="4962287" y="3530560"/>
+            <a:ext cx="2422763" cy="406049"/>
+          </a:xfrm>
+          <a:prstGeom prst="rect">
+            <a:avLst/>
+          </a:prstGeom>
+        </p:spPr>
+      </p:pic>
     </p:spTree>
     <p:extLst>
       <p:ext uri="{BB962C8B-B14F-4D97-AF65-F5344CB8AC3E}">

</xml_diff>